<commit_message>
Allow for actual song lyrics and general improvements
</commit_message>
<xml_diff>
--- a/Presentations/Remaja_template.pptx
+++ b/Presentations/Remaja_template.pptx
@@ -991,6 +991,9 @@
   <p:clrMapOvr>
     <a:masterClrMapping/>
   </p:clrMapOvr>
+  <p:transition spd="slow">
+    <p:fade/>
+  </p:transition>
 </p:sldLayout>
 </file>
 
@@ -4875,6 +4878,18 @@
   <p:clrMapOvr>
     <a:masterClrMapping/>
   </p:clrMapOvr>
+  <mc:AlternateContent xmlns:mc="http://schemas.openxmlformats.org/markup-compatibility/2006">
+    <mc:Choice xmlns:p14="http://schemas.microsoft.com/office/powerpoint/2010/main" Requires="p14">
+      <p:transition spd="med" p14:dur="700">
+        <p:fade/>
+      </p:transition>
+    </mc:Choice>
+    <mc:Fallback>
+      <p:transition spd="med">
+        <p:fade/>
+      </p:transition>
+    </mc:Fallback>
+  </mc:AlternateContent>
 </p:sldLayout>
 </file>
 
@@ -5047,6 +5062,18 @@
   <p:clrMapOvr>
     <a:masterClrMapping/>
   </p:clrMapOvr>
+  <mc:AlternateContent xmlns:mc="http://schemas.openxmlformats.org/markup-compatibility/2006">
+    <mc:Choice xmlns:p14="http://schemas.microsoft.com/office/powerpoint/2010/main" Requires="p14">
+      <p:transition spd="med" p14:dur="700">
+        <p:fade/>
+      </p:transition>
+    </mc:Choice>
+    <mc:Fallback>
+      <p:transition spd="med">
+        <p:fade/>
+      </p:transition>
+    </mc:Fallback>
+  </mc:AlternateContent>
 </p:sldLayout>
 </file>
 
@@ -5219,6 +5246,18 @@
   <p:clrMapOvr>
     <a:masterClrMapping/>
   </p:clrMapOvr>
+  <mc:AlternateContent xmlns:mc="http://schemas.openxmlformats.org/markup-compatibility/2006">
+    <mc:Choice xmlns:p14="http://schemas.microsoft.com/office/powerpoint/2010/main" Requires="p14">
+      <p:transition spd="med" p14:dur="700">
+        <p:fade/>
+      </p:transition>
+    </mc:Choice>
+    <mc:Fallback>
+      <p:transition spd="med">
+        <p:fade/>
+      </p:transition>
+    </mc:Fallback>
+  </mc:AlternateContent>
 </p:sldLayout>
 </file>
 
@@ -5435,6 +5474,9 @@
   <p:clrMapOvr>
     <a:masterClrMapping/>
   </p:clrMapOvr>
+  <p:transition>
+    <p:fade/>
+  </p:transition>
   <p:extLst>
     <p:ext uri="{DCECCB84-F9BA-43D5-87BE-67443E8EF086}">
       <p15:sldGuideLst xmlns:p15="http://schemas.microsoft.com/office/powerpoint/2012/main">
@@ -5667,6 +5709,9 @@
   <p:clrMapOvr>
     <a:masterClrMapping/>
   </p:clrMapOvr>
+  <p:transition>
+    <p:fade/>
+  </p:transition>
   <p:extLst>
     <p:ext uri="{DCECCB84-F9BA-43D5-87BE-67443E8EF086}">
       <p15:sldGuideLst xmlns:p15="http://schemas.microsoft.com/office/powerpoint/2012/main">
@@ -5940,6 +5985,9 @@
   <p:clrMapOvr>
     <a:masterClrMapping/>
   </p:clrMapOvr>
+  <p:transition>
+    <p:fade/>
+  </p:transition>
   <p:extLst>
     <p:ext uri="{DCECCB84-F9BA-43D5-87BE-67443E8EF086}">
       <p15:sldGuideLst xmlns:p15="http://schemas.microsoft.com/office/powerpoint/2012/main">
@@ -7857,9 +7905,18 @@
   <p:clrMapOvr>
     <a:masterClrMapping/>
   </p:clrMapOvr>
-  <p:transition spd="slow">
-    <p:fade/>
-  </p:transition>
+  <mc:AlternateContent xmlns:mc="http://schemas.openxmlformats.org/markup-compatibility/2006">
+    <mc:Choice xmlns:p14="http://schemas.microsoft.com/office/powerpoint/2010/main" Requires="p14">
+      <p:transition spd="med" p14:dur="700">
+        <p:fade/>
+      </p:transition>
+    </mc:Choice>
+    <mc:Fallback>
+      <p:transition spd="med">
+        <p:fade/>
+      </p:transition>
+    </mc:Fallback>
+  </mc:AlternateContent>
 </p:sld>
 </file>
 

</xml_diff>

<commit_message>
Make slide automatically use the next saturday's date
</commit_message>
<xml_diff>
--- a/Presentations/Remaja_template.pptx
+++ b/Presentations/Remaja_template.pptx
@@ -1790,7 +1790,10 @@
           <a:lstStyle/>
           <a:p>
             <a:pPr algn="ctr"/>
-            <a:endParaRPr lang="en-US"/>
+            <a:r>
+              <a:rPr lang="en-US" dirty="0"/>
+              <a:t>3</a:t>
+            </a:r>
           </a:p>
         </p:txBody>
       </p:sp>

</xml_diff>